<commit_message>
fixing small css bug; adding shukri
</commit_message>
<xml_diff>
--- a/presentation/Banana.pptx
+++ b/presentation/Banana.pptx
@@ -834,6 +834,7 @@
           <a:p>
             <a:fld id="{948B82F0-D568-428E-8410-621D44441AD8}" type="datetimeFigureOut">
               <a:rPr lang="en-US" smtClean="0"/>
+              <a:pPr/>
               <a:t>7/31/2014</a:t>
             </a:fld>
             <a:endParaRPr lang="en-US"/>
@@ -876,6 +877,7 @@
           <a:p>
             <a:fld id="{B1725D2B-0B53-4D0E-97F0-5CE2FB65B0A2}" type="slidenum">
               <a:rPr lang="en-US" smtClean="0"/>
+              <a:pPr/>
               <a:t>‹#›</a:t>
             </a:fld>
             <a:endParaRPr lang="en-US"/>
@@ -885,7 +887,7 @@
     </p:spTree>
     <p:extLst>
       <p:ext uri="{BB962C8B-B14F-4D97-AF65-F5344CB8AC3E}">
-        <p14:creationId xmlns:p14="http://schemas.microsoft.com/office/powerpoint/2010/main" val="3986969728"/>
+        <p14:creationId xmlns:p14="http://schemas.microsoft.com/office/powerpoint/2010/main" xmlns="" val="3986969728"/>
       </p:ext>
     </p:extLst>
   </p:cSld>
@@ -1085,6 +1087,7 @@
           <a:p>
             <a:fld id="{948B82F0-D568-428E-8410-621D44441AD8}" type="datetimeFigureOut">
               <a:rPr lang="en-US" smtClean="0"/>
+              <a:pPr/>
               <a:t>7/31/2014</a:t>
             </a:fld>
             <a:endParaRPr lang="en-US"/>
@@ -1127,6 +1130,7 @@
           <a:p>
             <a:fld id="{B1725D2B-0B53-4D0E-97F0-5CE2FB65B0A2}" type="slidenum">
               <a:rPr lang="en-US" smtClean="0"/>
+              <a:pPr/>
               <a:t>‹#›</a:t>
             </a:fld>
             <a:endParaRPr lang="en-US"/>
@@ -1136,7 +1140,7 @@
     </p:spTree>
     <p:extLst>
       <p:ext uri="{BB962C8B-B14F-4D97-AF65-F5344CB8AC3E}">
-        <p14:creationId xmlns:p14="http://schemas.microsoft.com/office/powerpoint/2010/main" val="66134191"/>
+        <p14:creationId xmlns:p14="http://schemas.microsoft.com/office/powerpoint/2010/main" xmlns="" val="66134191"/>
       </p:ext>
     </p:extLst>
   </p:cSld>
@@ -1399,6 +1403,7 @@
           <a:p>
             <a:fld id="{948B82F0-D568-428E-8410-621D44441AD8}" type="datetimeFigureOut">
               <a:rPr lang="en-US" smtClean="0"/>
+              <a:pPr/>
               <a:t>7/31/2014</a:t>
             </a:fld>
             <a:endParaRPr lang="en-US"/>
@@ -1441,6 +1446,7 @@
           <a:p>
             <a:fld id="{B1725D2B-0B53-4D0E-97F0-5CE2FB65B0A2}" type="slidenum">
               <a:rPr lang="en-US" smtClean="0"/>
+              <a:pPr/>
               <a:t>‹#›</a:t>
             </a:fld>
             <a:endParaRPr lang="en-US"/>
@@ -1540,7 +1546,7 @@
     </p:spTree>
     <p:extLst>
       <p:ext uri="{BB962C8B-B14F-4D97-AF65-F5344CB8AC3E}">
-        <p14:creationId xmlns:p14="http://schemas.microsoft.com/office/powerpoint/2010/main" val="3538286800"/>
+        <p14:creationId xmlns:p14="http://schemas.microsoft.com/office/powerpoint/2010/main" xmlns="" val="3538286800"/>
       </p:ext>
     </p:extLst>
   </p:cSld>
@@ -1740,6 +1746,7 @@
           <a:p>
             <a:fld id="{948B82F0-D568-428E-8410-621D44441AD8}" type="datetimeFigureOut">
               <a:rPr lang="en-US" smtClean="0"/>
+              <a:pPr/>
               <a:t>7/31/2014</a:t>
             </a:fld>
             <a:endParaRPr lang="en-US"/>
@@ -1782,6 +1789,7 @@
           <a:p>
             <a:fld id="{B1725D2B-0B53-4D0E-97F0-5CE2FB65B0A2}" type="slidenum">
               <a:rPr lang="en-US" smtClean="0"/>
+              <a:pPr/>
               <a:t>‹#›</a:t>
             </a:fld>
             <a:endParaRPr lang="en-US"/>
@@ -1791,7 +1799,7 @@
     </p:spTree>
     <p:extLst>
       <p:ext uri="{BB962C8B-B14F-4D97-AF65-F5344CB8AC3E}">
-        <p14:creationId xmlns:p14="http://schemas.microsoft.com/office/powerpoint/2010/main" val="2105783902"/>
+        <p14:creationId xmlns:p14="http://schemas.microsoft.com/office/powerpoint/2010/main" xmlns="" val="2105783902"/>
       </p:ext>
     </p:extLst>
   </p:cSld>
@@ -2054,6 +2062,7 @@
           <a:p>
             <a:fld id="{948B82F0-D568-428E-8410-621D44441AD8}" type="datetimeFigureOut">
               <a:rPr lang="en-US" smtClean="0"/>
+              <a:pPr/>
               <a:t>7/31/2014</a:t>
             </a:fld>
             <a:endParaRPr lang="en-US"/>
@@ -2096,6 +2105,7 @@
           <a:p>
             <a:fld id="{B1725D2B-0B53-4D0E-97F0-5CE2FB65B0A2}" type="slidenum">
               <a:rPr lang="en-US" smtClean="0"/>
+              <a:pPr/>
               <a:t>‹#›</a:t>
             </a:fld>
             <a:endParaRPr lang="en-US"/>
@@ -2187,7 +2197,7 @@
     </p:spTree>
     <p:extLst>
       <p:ext uri="{BB962C8B-B14F-4D97-AF65-F5344CB8AC3E}">
-        <p14:creationId xmlns:p14="http://schemas.microsoft.com/office/powerpoint/2010/main" val="2543856336"/>
+        <p14:creationId xmlns:p14="http://schemas.microsoft.com/office/powerpoint/2010/main" xmlns="" val="2543856336"/>
       </p:ext>
     </p:extLst>
   </p:cSld>
@@ -2447,6 +2457,7 @@
           <a:p>
             <a:fld id="{948B82F0-D568-428E-8410-621D44441AD8}" type="datetimeFigureOut">
               <a:rPr lang="en-US" smtClean="0"/>
+              <a:pPr/>
               <a:t>7/31/2014</a:t>
             </a:fld>
             <a:endParaRPr lang="en-US"/>
@@ -2489,6 +2500,7 @@
           <a:p>
             <a:fld id="{B1725D2B-0B53-4D0E-97F0-5CE2FB65B0A2}" type="slidenum">
               <a:rPr lang="en-US" smtClean="0"/>
+              <a:pPr/>
               <a:t>‹#›</a:t>
             </a:fld>
             <a:endParaRPr lang="en-US"/>
@@ -2498,7 +2510,7 @@
     </p:spTree>
     <p:extLst>
       <p:ext uri="{BB962C8B-B14F-4D97-AF65-F5344CB8AC3E}">
-        <p14:creationId xmlns:p14="http://schemas.microsoft.com/office/powerpoint/2010/main" val="1533951581"/>
+        <p14:creationId xmlns:p14="http://schemas.microsoft.com/office/powerpoint/2010/main" xmlns="" val="1533951581"/>
       </p:ext>
     </p:extLst>
   </p:cSld>
@@ -2617,6 +2629,7 @@
           <a:p>
             <a:fld id="{948B82F0-D568-428E-8410-621D44441AD8}" type="datetimeFigureOut">
               <a:rPr lang="en-US" smtClean="0"/>
+              <a:pPr/>
               <a:t>7/31/2014</a:t>
             </a:fld>
             <a:endParaRPr lang="en-US"/>
@@ -2659,6 +2672,7 @@
           <a:p>
             <a:fld id="{B1725D2B-0B53-4D0E-97F0-5CE2FB65B0A2}" type="slidenum">
               <a:rPr lang="en-US" smtClean="0"/>
+              <a:pPr/>
               <a:t>‹#›</a:t>
             </a:fld>
             <a:endParaRPr lang="en-US"/>
@@ -2668,7 +2682,7 @@
     </p:spTree>
     <p:extLst>
       <p:ext uri="{BB962C8B-B14F-4D97-AF65-F5344CB8AC3E}">
-        <p14:creationId xmlns:p14="http://schemas.microsoft.com/office/powerpoint/2010/main" val="3928320839"/>
+        <p14:creationId xmlns:p14="http://schemas.microsoft.com/office/powerpoint/2010/main" xmlns="" val="3928320839"/>
       </p:ext>
     </p:extLst>
   </p:cSld>
@@ -2797,6 +2811,7 @@
           <a:p>
             <a:fld id="{948B82F0-D568-428E-8410-621D44441AD8}" type="datetimeFigureOut">
               <a:rPr lang="en-US" smtClean="0"/>
+              <a:pPr/>
               <a:t>7/31/2014</a:t>
             </a:fld>
             <a:endParaRPr lang="en-US"/>
@@ -2839,6 +2854,7 @@
           <a:p>
             <a:fld id="{B1725D2B-0B53-4D0E-97F0-5CE2FB65B0A2}" type="slidenum">
               <a:rPr lang="en-US" smtClean="0"/>
+              <a:pPr/>
               <a:t>‹#›</a:t>
             </a:fld>
             <a:endParaRPr lang="en-US"/>
@@ -2848,7 +2864,7 @@
     </p:spTree>
     <p:extLst>
       <p:ext uri="{BB962C8B-B14F-4D97-AF65-F5344CB8AC3E}">
-        <p14:creationId xmlns:p14="http://schemas.microsoft.com/office/powerpoint/2010/main" val="3138445610"/>
+        <p14:creationId xmlns:p14="http://schemas.microsoft.com/office/powerpoint/2010/main" xmlns="" val="3138445610"/>
       </p:ext>
     </p:extLst>
   </p:cSld>
@@ -2973,6 +2989,7 @@
           <a:p>
             <a:fld id="{948B82F0-D568-428E-8410-621D44441AD8}" type="datetimeFigureOut">
               <a:rPr lang="en-US" smtClean="0"/>
+              <a:pPr/>
               <a:t>7/31/2014</a:t>
             </a:fld>
             <a:endParaRPr lang="en-US"/>
@@ -3015,6 +3032,7 @@
           <a:p>
             <a:fld id="{B1725D2B-0B53-4D0E-97F0-5CE2FB65B0A2}" type="slidenum">
               <a:rPr lang="en-US" smtClean="0"/>
+              <a:pPr/>
               <a:t>‹#›</a:t>
             </a:fld>
             <a:endParaRPr lang="en-US"/>
@@ -3024,7 +3042,7 @@
     </p:spTree>
     <p:extLst>
       <p:ext uri="{BB962C8B-B14F-4D97-AF65-F5344CB8AC3E}">
-        <p14:creationId xmlns:p14="http://schemas.microsoft.com/office/powerpoint/2010/main" val="1816420614"/>
+        <p14:creationId xmlns:p14="http://schemas.microsoft.com/office/powerpoint/2010/main" xmlns="" val="1816420614"/>
       </p:ext>
     </p:extLst>
   </p:cSld>
@@ -3220,6 +3238,7 @@
           <a:p>
             <a:fld id="{948B82F0-D568-428E-8410-621D44441AD8}" type="datetimeFigureOut">
               <a:rPr lang="en-US" smtClean="0"/>
+              <a:pPr/>
               <a:t>7/31/2014</a:t>
             </a:fld>
             <a:endParaRPr lang="en-US"/>
@@ -3262,6 +3281,7 @@
           <a:p>
             <a:fld id="{B1725D2B-0B53-4D0E-97F0-5CE2FB65B0A2}" type="slidenum">
               <a:rPr lang="en-US" smtClean="0"/>
+              <a:pPr/>
               <a:t>‹#›</a:t>
             </a:fld>
             <a:endParaRPr lang="en-US"/>
@@ -3271,7 +3291,7 @@
     </p:spTree>
     <p:extLst>
       <p:ext uri="{BB962C8B-B14F-4D97-AF65-F5344CB8AC3E}">
-        <p14:creationId xmlns:p14="http://schemas.microsoft.com/office/powerpoint/2010/main" val="1183022389"/>
+        <p14:creationId xmlns:p14="http://schemas.microsoft.com/office/powerpoint/2010/main" xmlns="" val="1183022389"/>
       </p:ext>
     </p:extLst>
   </p:cSld>
@@ -3452,6 +3472,7 @@
           <a:p>
             <a:fld id="{948B82F0-D568-428E-8410-621D44441AD8}" type="datetimeFigureOut">
               <a:rPr lang="en-US" smtClean="0"/>
+              <a:pPr/>
               <a:t>7/31/2014</a:t>
             </a:fld>
             <a:endParaRPr lang="en-US"/>
@@ -3494,6 +3515,7 @@
           <a:p>
             <a:fld id="{B1725D2B-0B53-4D0E-97F0-5CE2FB65B0A2}" type="slidenum">
               <a:rPr lang="en-US" smtClean="0"/>
+              <a:pPr/>
               <a:t>‹#›</a:t>
             </a:fld>
             <a:endParaRPr lang="en-US"/>
@@ -3503,7 +3525,7 @@
     </p:spTree>
     <p:extLst>
       <p:ext uri="{BB962C8B-B14F-4D97-AF65-F5344CB8AC3E}">
-        <p14:creationId xmlns:p14="http://schemas.microsoft.com/office/powerpoint/2010/main" val="2665907349"/>
+        <p14:creationId xmlns:p14="http://schemas.microsoft.com/office/powerpoint/2010/main" xmlns="" val="2665907349"/>
       </p:ext>
     </p:extLst>
   </p:cSld>
@@ -3826,6 +3848,7 @@
           <a:p>
             <a:fld id="{948B82F0-D568-428E-8410-621D44441AD8}" type="datetimeFigureOut">
               <a:rPr lang="en-US" smtClean="0"/>
+              <a:pPr/>
               <a:t>7/31/2014</a:t>
             </a:fld>
             <a:endParaRPr lang="en-US"/>
@@ -3868,6 +3891,7 @@
           <a:p>
             <a:fld id="{B1725D2B-0B53-4D0E-97F0-5CE2FB65B0A2}" type="slidenum">
               <a:rPr lang="en-US" smtClean="0"/>
+              <a:pPr/>
               <a:t>‹#›</a:t>
             </a:fld>
             <a:endParaRPr lang="en-US"/>
@@ -3877,7 +3901,7 @@
     </p:spTree>
     <p:extLst>
       <p:ext uri="{BB962C8B-B14F-4D97-AF65-F5344CB8AC3E}">
-        <p14:creationId xmlns:p14="http://schemas.microsoft.com/office/powerpoint/2010/main" val="1819206647"/>
+        <p14:creationId xmlns:p14="http://schemas.microsoft.com/office/powerpoint/2010/main" xmlns="" val="1819206647"/>
       </p:ext>
     </p:extLst>
   </p:cSld>
@@ -3949,6 +3973,7 @@
           <a:p>
             <a:fld id="{948B82F0-D568-428E-8410-621D44441AD8}" type="datetimeFigureOut">
               <a:rPr lang="en-US" smtClean="0"/>
+              <a:pPr/>
               <a:t>7/31/2014</a:t>
             </a:fld>
             <a:endParaRPr lang="en-US"/>
@@ -3991,6 +4016,7 @@
           <a:p>
             <a:fld id="{B1725D2B-0B53-4D0E-97F0-5CE2FB65B0A2}" type="slidenum">
               <a:rPr lang="en-US" smtClean="0"/>
+              <a:pPr/>
               <a:t>‹#›</a:t>
             </a:fld>
             <a:endParaRPr lang="en-US"/>
@@ -4000,7 +4026,7 @@
     </p:spTree>
     <p:extLst>
       <p:ext uri="{BB962C8B-B14F-4D97-AF65-F5344CB8AC3E}">
-        <p14:creationId xmlns:p14="http://schemas.microsoft.com/office/powerpoint/2010/main" val="3750940103"/>
+        <p14:creationId xmlns:p14="http://schemas.microsoft.com/office/powerpoint/2010/main" xmlns="" val="3750940103"/>
       </p:ext>
     </p:extLst>
   </p:cSld>
@@ -4044,6 +4070,7 @@
           <a:p>
             <a:fld id="{948B82F0-D568-428E-8410-621D44441AD8}" type="datetimeFigureOut">
               <a:rPr lang="en-US" smtClean="0"/>
+              <a:pPr/>
               <a:t>7/31/2014</a:t>
             </a:fld>
             <a:endParaRPr lang="en-US"/>
@@ -4086,6 +4113,7 @@
           <a:p>
             <a:fld id="{B1725D2B-0B53-4D0E-97F0-5CE2FB65B0A2}" type="slidenum">
               <a:rPr lang="en-US" smtClean="0"/>
+              <a:pPr/>
               <a:t>‹#›</a:t>
             </a:fld>
             <a:endParaRPr lang="en-US"/>
@@ -4095,7 +4123,7 @@
     </p:spTree>
     <p:extLst>
       <p:ext uri="{BB962C8B-B14F-4D97-AF65-F5344CB8AC3E}">
-        <p14:creationId xmlns:p14="http://schemas.microsoft.com/office/powerpoint/2010/main" val="3927515362"/>
+        <p14:creationId xmlns:p14="http://schemas.microsoft.com/office/powerpoint/2010/main" xmlns="" val="3927515362"/>
       </p:ext>
     </p:extLst>
   </p:cSld>
@@ -4299,6 +4327,7 @@
           <a:p>
             <a:fld id="{948B82F0-D568-428E-8410-621D44441AD8}" type="datetimeFigureOut">
               <a:rPr lang="en-US" smtClean="0"/>
+              <a:pPr/>
               <a:t>7/31/2014</a:t>
             </a:fld>
             <a:endParaRPr lang="en-US"/>
@@ -4341,6 +4370,7 @@
           <a:p>
             <a:fld id="{B1725D2B-0B53-4D0E-97F0-5CE2FB65B0A2}" type="slidenum">
               <a:rPr lang="en-US" smtClean="0"/>
+              <a:pPr/>
               <a:t>‹#›</a:t>
             </a:fld>
             <a:endParaRPr lang="en-US"/>
@@ -4350,7 +4380,7 @@
     </p:spTree>
     <p:extLst>
       <p:ext uri="{BB962C8B-B14F-4D97-AF65-F5344CB8AC3E}">
-        <p14:creationId xmlns:p14="http://schemas.microsoft.com/office/powerpoint/2010/main" val="3915285768"/>
+        <p14:creationId xmlns:p14="http://schemas.microsoft.com/office/powerpoint/2010/main" xmlns="" val="3915285768"/>
       </p:ext>
     </p:extLst>
   </p:cSld>
@@ -4562,6 +4592,7 @@
           <a:p>
             <a:fld id="{948B82F0-D568-428E-8410-621D44441AD8}" type="datetimeFigureOut">
               <a:rPr lang="en-US" smtClean="0"/>
+              <a:pPr/>
               <a:t>7/31/2014</a:t>
             </a:fld>
             <a:endParaRPr lang="en-US"/>
@@ -4604,6 +4635,7 @@
           <a:p>
             <a:fld id="{B1725D2B-0B53-4D0E-97F0-5CE2FB65B0A2}" type="slidenum">
               <a:rPr lang="en-US" smtClean="0"/>
+              <a:pPr/>
               <a:t>‹#›</a:t>
             </a:fld>
             <a:endParaRPr lang="en-US"/>
@@ -4613,7 +4645,7 @@
     </p:spTree>
     <p:extLst>
       <p:ext uri="{BB962C8B-B14F-4D97-AF65-F5344CB8AC3E}">
-        <p14:creationId xmlns:p14="http://schemas.microsoft.com/office/powerpoint/2010/main" val="265950377"/>
+        <p14:creationId xmlns:p14="http://schemas.microsoft.com/office/powerpoint/2010/main" xmlns="" val="265950377"/>
       </p:ext>
     </p:extLst>
   </p:cSld>
@@ -5305,6 +5337,7 @@
           <a:p>
             <a:fld id="{948B82F0-D568-428E-8410-621D44441AD8}" type="datetimeFigureOut">
               <a:rPr lang="en-US" smtClean="0"/>
+              <a:pPr/>
               <a:t>7/31/2014</a:t>
             </a:fld>
             <a:endParaRPr lang="en-US"/>
@@ -5381,6 +5414,7 @@
           <a:p>
             <a:fld id="{B1725D2B-0B53-4D0E-97F0-5CE2FB65B0A2}" type="slidenum">
               <a:rPr lang="en-US" smtClean="0"/>
+              <a:pPr/>
               <a:t>‹#›</a:t>
             </a:fld>
             <a:endParaRPr lang="en-US"/>
@@ -5390,7 +5424,7 @@
     </p:spTree>
     <p:extLst>
       <p:ext uri="{BB962C8B-B14F-4D97-AF65-F5344CB8AC3E}">
-        <p14:creationId xmlns:p14="http://schemas.microsoft.com/office/powerpoint/2010/main" val="2711241039"/>
+        <p14:creationId xmlns:p14="http://schemas.microsoft.com/office/powerpoint/2010/main" xmlns="" val="2711241039"/>
       </p:ext>
     </p:extLst>
   </p:cSld>
@@ -5894,7 +5928,7 @@
     </p:spTree>
     <p:extLst>
       <p:ext uri="{BB962C8B-B14F-4D97-AF65-F5344CB8AC3E}">
-        <p14:creationId xmlns:p14="http://schemas.microsoft.com/office/powerpoint/2010/main" val="2578899768"/>
+        <p14:creationId xmlns:p14="http://schemas.microsoft.com/office/powerpoint/2010/main" xmlns="" val="2578899768"/>
       </p:ext>
     </p:extLst>
   </p:cSld>
@@ -5967,8 +6001,14 @@
           <a:lstStyle/>
           <a:p>
             <a:r>
+              <a:rPr lang="en-US" dirty="0" smtClean="0">
+                <a:hlinkClick r:id="rId2"/>
+              </a:rPr>
+              <a:t>http://flyingbananas.atwebpages.com/</a:t>
+            </a:r>
+            <a:r>
               <a:rPr lang="en-US" dirty="0" smtClean="0"/>
-              <a:t>Mina add link here !</a:t>
+              <a:t> </a:t>
             </a:r>
             <a:endParaRPr lang="en-US" dirty="0"/>
           </a:p>
@@ -5977,7 +6017,7 @@
     </p:spTree>
     <p:extLst>
       <p:ext uri="{BB962C8B-B14F-4D97-AF65-F5344CB8AC3E}">
-        <p14:creationId xmlns:p14="http://schemas.microsoft.com/office/powerpoint/2010/main" val="4243514852"/>
+        <p14:creationId xmlns:p14="http://schemas.microsoft.com/office/powerpoint/2010/main" xmlns="" val="4243514852"/>
       </p:ext>
     </p:extLst>
   </p:cSld>
@@ -6056,7 +6096,7 @@
     </p:spTree>
     <p:extLst>
       <p:ext uri="{BB962C8B-B14F-4D97-AF65-F5344CB8AC3E}">
-        <p14:creationId xmlns:p14="http://schemas.microsoft.com/office/powerpoint/2010/main" val="2685002640"/>
+        <p14:creationId xmlns:p14="http://schemas.microsoft.com/office/powerpoint/2010/main" xmlns="" val="2685002640"/>
       </p:ext>
     </p:extLst>
   </p:cSld>
@@ -6136,7 +6176,7 @@
     </p:spTree>
     <p:extLst>
       <p:ext uri="{BB962C8B-B14F-4D97-AF65-F5344CB8AC3E}">
-        <p14:creationId xmlns:p14="http://schemas.microsoft.com/office/powerpoint/2010/main" val="1251007375"/>
+        <p14:creationId xmlns:p14="http://schemas.microsoft.com/office/powerpoint/2010/main" xmlns="" val="1251007375"/>
       </p:ext>
     </p:extLst>
   </p:cSld>
@@ -6215,7 +6255,7 @@
     </p:spTree>
     <p:extLst>
       <p:ext uri="{BB962C8B-B14F-4D97-AF65-F5344CB8AC3E}">
-        <p14:creationId xmlns:p14="http://schemas.microsoft.com/office/powerpoint/2010/main" val="2934794456"/>
+        <p14:creationId xmlns:p14="http://schemas.microsoft.com/office/powerpoint/2010/main" xmlns="" val="2934794456"/>
       </p:ext>
     </p:extLst>
   </p:cSld>
@@ -6267,7 +6307,11 @@
             <a:pPr algn="ctr"/>
             <a:r>
               <a:rPr lang="en-US" dirty="0" smtClean="0"/>
-              <a:t>Thank you for your attention !!</a:t>
+              <a:t>Thank you for your attention </a:t>
+            </a:r>
+            <a:r>
+              <a:rPr lang="en-US" dirty="0" smtClean="0"/>
+              <a:t>!!!</a:t>
             </a:r>
             <a:endParaRPr lang="en-US" dirty="0"/>
           </a:p>
@@ -6295,7 +6339,7 @@
     </p:spTree>
     <p:extLst>
       <p:ext uri="{BB962C8B-B14F-4D97-AF65-F5344CB8AC3E}">
-        <p14:creationId xmlns:p14="http://schemas.microsoft.com/office/powerpoint/2010/main" val="2878283849"/>
+        <p14:creationId xmlns:p14="http://schemas.microsoft.com/office/powerpoint/2010/main" xmlns="" val="2878283849"/>
       </p:ext>
     </p:extLst>
   </p:cSld>
@@ -6355,7 +6399,7 @@
     </a:clrScheme>
     <a:fontScheme name="Facet">
       <a:majorFont>
-        <a:latin typeface="Trebuchet MS" panose="020B0603020202020204"/>
+        <a:latin typeface="Trebuchet MS"/>
         <a:ea typeface=""/>
         <a:cs typeface=""/>
         <a:font script="Jpan" typeface="メイリオ"/>
@@ -6390,7 +6434,7 @@
         <a:font script="Geor" typeface="Sylfaen"/>
       </a:majorFont>
       <a:minorFont>
-        <a:latin typeface="Trebuchet MS" panose="020B0603020202020204"/>
+        <a:latin typeface="Trebuchet MS"/>
         <a:ea typeface=""/>
         <a:cs typeface=""/>
         <a:font script="Jpan" typeface="メイリオ"/>
@@ -6563,7 +6607,7 @@
   <a:extraClrSchemeLst/>
   <a:extLst>
     <a:ext uri="{05A4C25C-085E-4340-85A3-A5531E510DB2}">
-      <thm15:themeFamily xmlns:thm15="http://schemas.microsoft.com/office/thememl/2012/main" name="Facet" id="{C0C680CD-088A-49FC-A102-D699147F32B2}" vid="{CFBC31BA-B70F-4F30-BCAA-4F3011E16C4D}"/>
+      <thm15:themeFamily xmlns:thm15="http://schemas.microsoft.com/office/thememl/2012/main" xmlns="" name="Facet" id="{C0C680CD-088A-49FC-A102-D699147F32B2}" vid="{CFBC31BA-B70F-4F30-BCAA-4F3011E16C4D}"/>
     </a:ext>
   </a:extLst>
 </a:theme>

</xml_diff>